<commit_message>
small edit to sprint reveiw presentation
</commit_message>
<xml_diff>
--- a/SprintReviews/SprintReview_1.pptx
+++ b/SprintReviews/SprintReview_1.pptx
@@ -5536,14 +5536,9 @@
           <a:lstStyle/>
           <a:p>
             <a:r>
-              <a:rPr lang="nl-NL" dirty="0" err="1"/>
-              <a:t>Disign</a:t>
-            </a:r>
-            <a:r>
-              <a:rPr lang="nl-NL"/>
-              <a:t> UI</a:t>
-            </a:r>
-            <a:endParaRPr lang="nl-NL" dirty="0"/>
+              <a:rPr lang="nl-NL" dirty="0"/>
+              <a:t>Design UI</a:t>
+            </a:r>
           </a:p>
           <a:p>
             <a:r>
@@ -5553,14 +5548,29 @@
           </a:p>
           <a:p>
             <a:r>
+              <a:rPr lang="nl-NL" dirty="0" err="1"/>
+              <a:t>Create</a:t>
+            </a:r>
+            <a:r>
               <a:rPr lang="nl-NL" dirty="0"/>
-              <a:t>Start on </a:t>
+              <a:t> </a:t>
             </a:r>
             <a:r>
               <a:rPr lang="nl-NL" dirty="0" err="1"/>
               <a:t>Pong</a:t>
             </a:r>
-            <a:endParaRPr lang="LID4096" dirty="0"/>
+            <a:r>
+              <a:rPr lang="nl-NL" dirty="0"/>
+              <a:t> game </a:t>
+            </a:r>
+            <a:r>
+              <a:rPr lang="nl-NL" dirty="0" err="1"/>
+              <a:t>vs</a:t>
+            </a:r>
+            <a:r>
+              <a:rPr lang="nl-NL" dirty="0"/>
+              <a:t> AI</a:t>
+            </a:r>
           </a:p>
         </p:txBody>
       </p:sp>

</xml_diff>